<commit_message>
url on github added
</commit_message>
<xml_diff>
--- a/20140301/[DEV]Android Code Style.pptx
+++ b/20140301/[DEV]Android Code Style.pptx
@@ -109,6 +109,7 @@
         <p:txBody>
           <a:bodyPr anchor="ctr" bIns="0" lIns="0" rIns="0" tIns="0" wrap="none"/>
           <a:p>
+            <a:pPr algn="ctr"/>
             <a:endParaRPr/>
           </a:p>
         </p:txBody>
@@ -209,6 +210,7 @@
         <p:txBody>
           <a:bodyPr anchor="ctr" bIns="0" lIns="0" rIns="0" tIns="0" wrap="none"/>
           <a:p>
+            <a:pPr algn="ctr"/>
             <a:endParaRPr/>
           </a:p>
         </p:txBody>
@@ -361,6 +363,7 @@
         <p:txBody>
           <a:bodyPr anchor="ctr" bIns="0" lIns="0" rIns="0" tIns="0" wrap="none"/>
           <a:p>
+            <a:pPr algn="ctr"/>
             <a:endParaRPr/>
           </a:p>
         </p:txBody>
@@ -533,6 +536,7 @@
         <p:txBody>
           <a:bodyPr anchor="ctr" bIns="0" lIns="0" rIns="0" tIns="0" wrap="none"/>
           <a:p>
+            <a:pPr algn="ctr"/>
             <a:endParaRPr/>
           </a:p>
         </p:txBody>
@@ -608,6 +612,7 @@
         <p:txBody>
           <a:bodyPr anchor="ctr" bIns="0" lIns="0" rIns="0" tIns="0" wrap="none"/>
           <a:p>
+            <a:pPr algn="ctr"/>
             <a:endParaRPr/>
           </a:p>
         </p:txBody>
@@ -682,6 +687,7 @@
         <p:txBody>
           <a:bodyPr anchor="ctr" bIns="0" lIns="0" rIns="0" tIns="0" wrap="none"/>
           <a:p>
+            <a:pPr algn="ctr"/>
             <a:endParaRPr/>
           </a:p>
         </p:txBody>
@@ -782,6 +788,7 @@
         <p:txBody>
           <a:bodyPr anchor="ctr" bIns="0" lIns="0" rIns="0" tIns="0" wrap="none"/>
           <a:p>
+            <a:pPr algn="ctr"/>
             <a:endParaRPr/>
           </a:p>
         </p:txBody>
@@ -879,6 +886,7 @@
         <p:txBody>
           <a:bodyPr anchor="ctr" bIns="0" lIns="0" rIns="0" tIns="0" wrap="none"/>
           <a:p>
+            <a:pPr algn="ctr"/>
             <a:endParaRPr/>
           </a:p>
         </p:txBody>
@@ -1005,6 +1013,7 @@
         <p:txBody>
           <a:bodyPr anchor="ctr" bIns="0" lIns="0" rIns="0" tIns="0" wrap="none"/>
           <a:p>
+            <a:pPr algn="ctr"/>
             <a:endParaRPr/>
           </a:p>
         </p:txBody>
@@ -1080,6 +1089,7 @@
         <p:txBody>
           <a:bodyPr anchor="ctr" bIns="0" lIns="0" rIns="0" tIns="0" wrap="none"/>
           <a:p>
+            <a:pPr algn="ctr"/>
             <a:endParaRPr/>
           </a:p>
         </p:txBody>
@@ -1206,6 +1216,7 @@
         <p:txBody>
           <a:bodyPr anchor="ctr" bIns="0" lIns="0" rIns="0" tIns="0" wrap="none"/>
           <a:p>
+            <a:pPr algn="ctr"/>
             <a:endParaRPr/>
           </a:p>
         </p:txBody>
@@ -1332,6 +1343,7 @@
         <p:txBody>
           <a:bodyPr anchor="ctr" bIns="0" lIns="0" rIns="0" tIns="0" wrap="none"/>
           <a:p>
+            <a:pPr algn="ctr"/>
             <a:endParaRPr/>
           </a:p>
         </p:txBody>
@@ -1432,6 +1444,7 @@
         <p:txBody>
           <a:bodyPr anchor="ctr" bIns="0" lIns="0" rIns="0" tIns="0" wrap="none"/>
           <a:p>
+            <a:pPr algn="ctr"/>
             <a:endParaRPr/>
           </a:p>
         </p:txBody>
@@ -1584,6 +1597,7 @@
         <p:txBody>
           <a:bodyPr anchor="ctr" bIns="0" lIns="0" rIns="0" tIns="0" wrap="none"/>
           <a:p>
+            <a:pPr algn="ctr"/>
             <a:endParaRPr/>
           </a:p>
         </p:txBody>
@@ -1734,6 +1748,7 @@
         <p:txBody>
           <a:bodyPr anchor="ctr" bIns="0" lIns="0" rIns="0" tIns="0" wrap="none"/>
           <a:p>
+            <a:pPr algn="ctr"/>
             <a:endParaRPr/>
           </a:p>
         </p:txBody>
@@ -1808,6 +1823,7 @@
         <p:txBody>
           <a:bodyPr anchor="ctr" bIns="0" lIns="0" rIns="0" tIns="0" wrap="none"/>
           <a:p>
+            <a:pPr algn="ctr"/>
             <a:endParaRPr/>
           </a:p>
         </p:txBody>
@@ -1908,6 +1924,7 @@
         <p:txBody>
           <a:bodyPr anchor="ctr" bIns="0" lIns="0" rIns="0" tIns="0" wrap="none"/>
           <a:p>
+            <a:pPr algn="ctr"/>
             <a:endParaRPr/>
           </a:p>
         </p:txBody>
@@ -2005,6 +2022,7 @@
         <p:txBody>
           <a:bodyPr anchor="ctr" bIns="0" lIns="0" rIns="0" tIns="0" wrap="none"/>
           <a:p>
+            <a:pPr algn="ctr"/>
             <a:endParaRPr/>
           </a:p>
         </p:txBody>
@@ -2131,6 +2149,7 @@
         <p:txBody>
           <a:bodyPr anchor="ctr" bIns="0" lIns="0" rIns="0" tIns="0" wrap="none"/>
           <a:p>
+            <a:pPr algn="ctr"/>
             <a:endParaRPr/>
           </a:p>
         </p:txBody>
@@ -2257,6 +2276,7 @@
         <p:txBody>
           <a:bodyPr anchor="ctr" bIns="0" lIns="0" rIns="0" tIns="0" wrap="none"/>
           <a:p>
+            <a:pPr algn="ctr"/>
             <a:endParaRPr/>
           </a:p>
         </p:txBody>
@@ -2376,7 +2396,7 @@
         <p:spPr>
           <a:xfrm>
             <a:off x="720" y="720"/>
-            <a:ext cx="10078920" cy="7558920"/>
+            <a:ext cx="10078560" cy="7558560"/>
           </a:xfrm>
           <a:prstGeom prst="rect">
             <a:avLst/>
@@ -2398,8 +2418,8 @@
         </p:nvSpPr>
         <p:spPr>
           <a:xfrm>
-            <a:off x="504000" y="576000"/>
-            <a:ext cx="7199280" cy="720000"/>
+            <a:off x="504000" y="301320"/>
+            <a:ext cx="9072000" cy="1261800"/>
           </a:xfrm>
           <a:prstGeom prst="rect">
             <a:avLst/>
@@ -2408,8 +2428,9 @@
         <p:txBody>
           <a:bodyPr anchor="ctr" bIns="0" lIns="0" rIns="0" tIns="0" wrap="none"/>
           <a:p>
-            <a:r>
-              <a:rPr lang="zh-CN"/>
+            <a:pPr algn="ctr"/>
+            <a:r>
+              <a:rPr lang="en-US"/>
               <a:t>Click to edit the title text format</a:t>
             </a:r>
             <a:endParaRPr/>
@@ -2428,8 +2449,8 @@
         </p:nvSpPr>
         <p:spPr>
           <a:xfrm>
-            <a:off x="504000" y="1800000"/>
-            <a:ext cx="9071280" cy="4383720"/>
+            <a:off x="504000" y="1768680"/>
+            <a:ext cx="9072000" cy="4384080"/>
           </a:xfrm>
           <a:prstGeom prst="rect">
             <a:avLst/>
@@ -2444,7 +2465,7 @@
               <a:buChar char=""/>
             </a:pPr>
             <a:r>
-              <a:rPr lang="zh-CN"/>
+              <a:rPr lang="en-US"/>
               <a:t>Click to edit the outline text format</a:t>
             </a:r>
             <a:endParaRPr/>
@@ -2456,7 +2477,7 @@
               <a:buChar char=""/>
             </a:pPr>
             <a:r>
-              <a:rPr lang="zh-CN"/>
+              <a:rPr lang="en-US"/>
               <a:t>Second Outline Level</a:t>
             </a:r>
             <a:endParaRPr/>
@@ -2468,7 +2489,7 @@
               <a:buChar char=""/>
             </a:pPr>
             <a:r>
-              <a:rPr lang="zh-CN"/>
+              <a:rPr lang="en-US"/>
               <a:t>Third Outline Level</a:t>
             </a:r>
             <a:endParaRPr/>
@@ -2480,7 +2501,7 @@
               <a:buChar char=""/>
             </a:pPr>
             <a:r>
-              <a:rPr lang="zh-CN"/>
+              <a:rPr lang="en-US"/>
               <a:t>Fourth Outline Level</a:t>
             </a:r>
             <a:endParaRPr/>
@@ -2492,7 +2513,7 @@
               <a:buChar char=""/>
             </a:pPr>
             <a:r>
-              <a:rPr lang="zh-CN"/>
+              <a:rPr lang="en-US"/>
               <a:t>Fifth Outline Level</a:t>
             </a:r>
             <a:endParaRPr/>
@@ -2504,7 +2525,7 @@
               <a:buChar char=""/>
             </a:pPr>
             <a:r>
-              <a:rPr lang="zh-CN"/>
+              <a:rPr lang="en-US"/>
               <a:t>Sixth Outline Level</a:t>
             </a:r>
             <a:endParaRPr/>
@@ -2516,7 +2537,7 @@
               <a:buChar char=""/>
             </a:pPr>
             <a:r>
-              <a:rPr lang="zh-CN"/>
+              <a:rPr lang="en-US"/>
               <a:t>Seventh Outline Level</a:t>
             </a:r>
             <a:endParaRPr/>
@@ -2575,7 +2596,7 @@
         <p:spPr>
           <a:xfrm>
             <a:off x="720" y="720"/>
-            <a:ext cx="10078920" cy="7558920"/>
+            <a:ext cx="10078560" cy="7558560"/>
           </a:xfrm>
           <a:prstGeom prst="rect">
             <a:avLst/>
@@ -2607,8 +2628,9 @@
         <p:txBody>
           <a:bodyPr anchor="ctr" bIns="0" lIns="0" rIns="0" tIns="0" wrap="none"/>
           <a:p>
-            <a:r>
-              <a:rPr lang="zh-CN"/>
+            <a:pPr algn="ctr"/>
+            <a:r>
+              <a:rPr lang="en-US"/>
               <a:t>Click to edit the title text format</a:t>
             </a:r>
             <a:endParaRPr/>
@@ -2643,7 +2665,7 @@
               <a:buChar char=""/>
             </a:pPr>
             <a:r>
-              <a:rPr lang="zh-CN"/>
+              <a:rPr lang="en-US"/>
               <a:t>Click to edit the outline text format</a:t>
             </a:r>
             <a:endParaRPr/>
@@ -2655,7 +2677,7 @@
               <a:buChar char=""/>
             </a:pPr>
             <a:r>
-              <a:rPr lang="zh-CN"/>
+              <a:rPr lang="en-US"/>
               <a:t>Second Outline Level</a:t>
             </a:r>
             <a:endParaRPr/>
@@ -2667,7 +2689,7 @@
               <a:buChar char=""/>
             </a:pPr>
             <a:r>
-              <a:rPr lang="zh-CN"/>
+              <a:rPr lang="en-US"/>
               <a:t>Third Outline Level</a:t>
             </a:r>
             <a:endParaRPr/>
@@ -2679,7 +2701,7 @@
               <a:buChar char=""/>
             </a:pPr>
             <a:r>
-              <a:rPr lang="zh-CN"/>
+              <a:rPr lang="en-US"/>
               <a:t>Fourth Outline Level</a:t>
             </a:r>
             <a:endParaRPr/>
@@ -2691,7 +2713,7 @@
               <a:buChar char=""/>
             </a:pPr>
             <a:r>
-              <a:rPr lang="zh-CN"/>
+              <a:rPr lang="en-US"/>
               <a:t>Fifth Outline Level</a:t>
             </a:r>
             <a:endParaRPr/>
@@ -2703,7 +2725,7 @@
               <a:buChar char=""/>
             </a:pPr>
             <a:r>
-              <a:rPr lang="zh-CN"/>
+              <a:rPr lang="en-US"/>
               <a:t>Sixth Outline Level</a:t>
             </a:r>
             <a:endParaRPr/>
@@ -2715,7 +2737,7 @@
               <a:buChar char=""/>
             </a:pPr>
             <a:r>
-              <a:rPr lang="zh-CN"/>
+              <a:rPr lang="en-US"/>
               <a:t>Seventh Outline Level</a:t>
             </a:r>
             <a:endParaRPr/>
@@ -2768,7 +2790,7 @@
         <p:spPr>
           <a:xfrm>
             <a:off x="720000" y="3168000"/>
-            <a:ext cx="8567280" cy="1559520"/>
+            <a:ext cx="8566920" cy="1559160"/>
           </a:xfrm>
           <a:prstGeom prst="rect">
             <a:avLst/>
@@ -2817,7 +2839,7 @@
         <p:spPr>
           <a:xfrm>
             <a:off x="504000" y="1823760"/>
-            <a:ext cx="9071280" cy="1674360"/>
+            <a:ext cx="9070920" cy="1674000"/>
           </a:xfrm>
           <a:prstGeom prst="rect">
             <a:avLst/>
@@ -2858,7 +2880,7 @@
         <p:spPr>
           <a:xfrm>
             <a:off x="648000" y="6076080"/>
-            <a:ext cx="8567280" cy="619200"/>
+            <a:ext cx="8566920" cy="618840"/>
           </a:xfrm>
           <a:prstGeom prst="rect">
             <a:avLst/>
@@ -2948,7 +2970,7 @@
         <p:spPr>
           <a:xfrm>
             <a:off x="504000" y="576000"/>
-            <a:ext cx="7199280" cy="719280"/>
+            <a:ext cx="7198920" cy="718920"/>
           </a:xfrm>
           <a:prstGeom prst="rect">
             <a:avLst/>
@@ -2968,7 +2990,7 @@
         <p:spPr>
           <a:xfrm>
             <a:off x="504000" y="2494080"/>
-            <a:ext cx="9071280" cy="3689640"/>
+            <a:ext cx="9070920" cy="3689280"/>
           </a:xfrm>
           <a:prstGeom prst="rect">
             <a:avLst/>
@@ -3079,7 +3101,7 @@
         <p:spPr>
           <a:xfrm>
             <a:off x="504000" y="576000"/>
-            <a:ext cx="7199280" cy="720000"/>
+            <a:ext cx="7198920" cy="719640"/>
           </a:xfrm>
           <a:prstGeom prst="rect">
             <a:avLst/>
@@ -3169,7 +3191,7 @@
         <p:spPr>
           <a:xfrm>
             <a:off x="504000" y="576000"/>
-            <a:ext cx="7199280" cy="719280"/>
+            <a:ext cx="7198920" cy="718920"/>
           </a:xfrm>
           <a:prstGeom prst="rect">
             <a:avLst/>
@@ -3189,7 +3211,7 @@
         <p:spPr>
           <a:xfrm>
             <a:off x="504000" y="1779480"/>
-            <a:ext cx="9071280" cy="4404240"/>
+            <a:ext cx="9070920" cy="4403880"/>
           </a:xfrm>
           <a:prstGeom prst="rect">
             <a:avLst/>
@@ -3356,7 +3378,7 @@
         <p:spPr>
           <a:xfrm>
             <a:off x="504000" y="576000"/>
-            <a:ext cx="7199280" cy="720000"/>
+            <a:ext cx="7198920" cy="719640"/>
           </a:xfrm>
           <a:prstGeom prst="rect">
             <a:avLst/>
@@ -3439,18 +3461,22 @@
       </p:grpSpPr>
       <p:sp>
         <p:nvSpPr>
-          <p:cNvPr id="106" name="TextShape 1"/>
-          <p:cNvSpPr txBox="1"/>
+          <p:cNvPr id="106" name="CustomShape 1"/>
+          <p:cNvSpPr/>
           <p:nvPr/>
         </p:nvSpPr>
         <p:spPr>
           <a:xfrm>
             <a:off x="504000" y="576000"/>
-            <a:ext cx="7199280" cy="720000"/>
-          </a:xfrm>
-          <a:prstGeom prst="rect">
-            <a:avLst/>
-          </a:prstGeom>
+            <a:ext cx="7198920" cy="719640"/>
+          </a:xfrm>
+          <a:prstGeom prst="rect">
+            <a:avLst/>
+          </a:prstGeom>
+          <a:noFill/>
+          <a:ln>
+            <a:noFill/>
+          </a:ln>
         </p:spPr>
         <p:txBody>
           <a:bodyPr anchor="ctr" bIns="0" lIns="0" rIns="0" tIns="0"/>
@@ -3461,7 +3487,7 @@
               </a:lnSpc>
             </a:pPr>
             <a:r>
-              <a:rPr lang="zh-CN" sz="3600">
+              <a:rPr lang="en-US" sz="3600">
                 <a:solidFill>
                   <a:srgbClr val="000000"/>
                 </a:solidFill>
@@ -3476,24 +3502,28 @@
       </p:sp>
       <p:sp>
         <p:nvSpPr>
-          <p:cNvPr id="107" name="TextShape 2"/>
-          <p:cNvSpPr txBox="1"/>
+          <p:cNvPr id="107" name="CustomShape 2"/>
+          <p:cNvSpPr/>
           <p:nvPr/>
         </p:nvSpPr>
         <p:spPr>
           <a:xfrm>
             <a:off x="968400" y="1851120"/>
-            <a:ext cx="7199280" cy="720000"/>
-          </a:xfrm>
-          <a:prstGeom prst="rect">
-            <a:avLst/>
-          </a:prstGeom>
+            <a:ext cx="7198920" cy="719640"/>
+          </a:xfrm>
+          <a:prstGeom prst="rect">
+            <a:avLst/>
+          </a:prstGeom>
+          <a:noFill/>
+          <a:ln>
+            <a:noFill/>
+          </a:ln>
         </p:spPr>
         <p:txBody>
           <a:bodyPr bIns="0" lIns="0" rIns="0" tIns="0"/>
           <a:p>
             <a:r>
-              <a:rPr lang="zh-CN" sz="2400"/>
+              <a:rPr lang="en-US" sz="2400"/>
               <a:t>Make it like this:</a:t>
             </a:r>
             <a:endParaRPr/>
@@ -3515,7 +3545,7 @@
         <p:spPr>
           <a:xfrm>
             <a:off x="611280" y="2851200"/>
-            <a:ext cx="8986320" cy="2785680"/>
+            <a:ext cx="8985960" cy="2785320"/>
           </a:xfrm>
           <a:prstGeom prst="rect">
             <a:avLst/>
@@ -3556,7 +3586,7 @@
         <p:spPr>
           <a:xfrm>
             <a:off x="504000" y="576000"/>
-            <a:ext cx="7199280" cy="719280"/>
+            <a:ext cx="7198920" cy="718920"/>
           </a:xfrm>
           <a:prstGeom prst="rect">
             <a:avLst/>
@@ -3576,7 +3606,7 @@
         <p:spPr>
           <a:xfrm>
             <a:off x="504000" y="2494080"/>
-            <a:ext cx="9071280" cy="3689640"/>
+            <a:ext cx="9070920" cy="3689280"/>
           </a:xfrm>
           <a:prstGeom prst="rect">
             <a:avLst/>
@@ -3659,7 +3689,7 @@
         <p:spPr>
           <a:xfrm>
             <a:off x="504000" y="576000"/>
-            <a:ext cx="7199280" cy="720000"/>
+            <a:ext cx="7198920" cy="719640"/>
           </a:xfrm>
           <a:prstGeom prst="rect">
             <a:avLst/>
@@ -3742,18 +3772,22 @@
       </p:grpSpPr>
       <p:sp>
         <p:nvSpPr>
-          <p:cNvPr id="112" name="TextShape 1"/>
-          <p:cNvSpPr txBox="1"/>
+          <p:cNvPr id="112" name="CustomShape 1"/>
+          <p:cNvSpPr/>
           <p:nvPr/>
         </p:nvSpPr>
         <p:spPr>
           <a:xfrm>
             <a:off x="504000" y="576000"/>
-            <a:ext cx="7199280" cy="720000"/>
-          </a:xfrm>
-          <a:prstGeom prst="rect">
-            <a:avLst/>
-          </a:prstGeom>
+            <a:ext cx="7198920" cy="719640"/>
+          </a:xfrm>
+          <a:prstGeom prst="rect">
+            <a:avLst/>
+          </a:prstGeom>
+          <a:noFill/>
+          <a:ln>
+            <a:noFill/>
+          </a:ln>
         </p:spPr>
         <p:txBody>
           <a:bodyPr anchor="ctr" bIns="0" lIns="0" rIns="0" tIns="0"/>
@@ -3764,7 +3798,7 @@
               </a:lnSpc>
             </a:pPr>
             <a:r>
-              <a:rPr lang="zh-CN" sz="3600">
+              <a:rPr lang="en-US" sz="3600">
                 <a:solidFill>
                   <a:srgbClr val="000000"/>
                 </a:solidFill>
@@ -3779,24 +3813,28 @@
       </p:sp>
       <p:sp>
         <p:nvSpPr>
-          <p:cNvPr id="113" name="TextShape 2"/>
-          <p:cNvSpPr txBox="1"/>
+          <p:cNvPr id="113" name="CustomShape 2"/>
+          <p:cNvSpPr/>
           <p:nvPr/>
         </p:nvSpPr>
         <p:spPr>
           <a:xfrm>
             <a:off x="968400" y="1851120"/>
-            <a:ext cx="7199280" cy="720000"/>
-          </a:xfrm>
-          <a:prstGeom prst="rect">
-            <a:avLst/>
-          </a:prstGeom>
+            <a:ext cx="7198920" cy="719640"/>
+          </a:xfrm>
+          <a:prstGeom prst="rect">
+            <a:avLst/>
+          </a:prstGeom>
+          <a:noFill/>
+          <a:ln>
+            <a:noFill/>
+          </a:ln>
         </p:spPr>
         <p:txBody>
           <a:bodyPr bIns="0" lIns="0" rIns="0" tIns="0"/>
           <a:p>
             <a:r>
-              <a:rPr lang="zh-CN" sz="2400"/>
+              <a:rPr lang="en-US" sz="2400"/>
               <a:t>Make it like this:</a:t>
             </a:r>
             <a:endParaRPr/>
@@ -3818,7 +3856,7 @@
         <p:spPr>
           <a:xfrm>
             <a:off x="1539720" y="2494080"/>
-            <a:ext cx="6471000" cy="4214520"/>
+            <a:ext cx="6470640" cy="4214160"/>
           </a:xfrm>
           <a:prstGeom prst="rect">
             <a:avLst/>
@@ -3859,7 +3897,7 @@
         <p:spPr>
           <a:xfrm>
             <a:off x="504000" y="576000"/>
-            <a:ext cx="7199280" cy="719280"/>
+            <a:ext cx="7198920" cy="718920"/>
           </a:xfrm>
           <a:prstGeom prst="rect">
             <a:avLst/>
@@ -3879,7 +3917,7 @@
         <p:spPr>
           <a:xfrm>
             <a:off x="504000" y="1851120"/>
-            <a:ext cx="4178880" cy="4332600"/>
+            <a:ext cx="4178520" cy="4332240"/>
           </a:xfrm>
           <a:prstGeom prst="rect">
             <a:avLst/>
@@ -4056,7 +4094,7 @@
         <p:spPr>
           <a:xfrm>
             <a:off x="504000" y="576000"/>
-            <a:ext cx="7199280" cy="720000"/>
+            <a:ext cx="7198920" cy="719640"/>
           </a:xfrm>
           <a:prstGeom prst="rect">
             <a:avLst/>
@@ -4097,7 +4135,7 @@
         <p:spPr>
           <a:xfrm>
             <a:off x="5040360" y="1851120"/>
-            <a:ext cx="4178880" cy="4332600"/>
+            <a:ext cx="4178520" cy="4332240"/>
           </a:xfrm>
           <a:prstGeom prst="rect">
             <a:avLst/>
@@ -4257,7 +4295,7 @@
         <p:spPr>
           <a:xfrm>
             <a:off x="504000" y="576000"/>
-            <a:ext cx="7199280" cy="719280"/>
+            <a:ext cx="7198920" cy="718920"/>
           </a:xfrm>
           <a:prstGeom prst="rect">
             <a:avLst/>
@@ -4277,7 +4315,7 @@
         <p:spPr>
           <a:xfrm>
             <a:off x="504000" y="1851120"/>
-            <a:ext cx="7679160" cy="4332600"/>
+            <a:ext cx="7678800" cy="4332240"/>
           </a:xfrm>
           <a:prstGeom prst="rect">
             <a:avLst/>
@@ -4422,7 +4460,7 @@
         <p:spPr>
           <a:xfrm>
             <a:off x="504000" y="576000"/>
-            <a:ext cx="7199280" cy="720000"/>
+            <a:ext cx="7198920" cy="719640"/>
           </a:xfrm>
           <a:prstGeom prst="rect">
             <a:avLst/>
@@ -4512,7 +4550,7 @@
         <p:spPr>
           <a:xfrm>
             <a:off x="504000" y="576000"/>
-            <a:ext cx="7199280" cy="719280"/>
+            <a:ext cx="7198920" cy="718920"/>
           </a:xfrm>
           <a:prstGeom prst="rect">
             <a:avLst/>
@@ -4532,7 +4570,7 @@
         <p:spPr>
           <a:xfrm>
             <a:off x="504000" y="1851120"/>
-            <a:ext cx="8393760" cy="4332600"/>
+            <a:ext cx="8393400" cy="4332240"/>
           </a:xfrm>
           <a:prstGeom prst="rect">
             <a:avLst/>
@@ -4673,7 +4711,7 @@
         <p:spPr>
           <a:xfrm>
             <a:off x="504000" y="576000"/>
-            <a:ext cx="7199280" cy="720000"/>
+            <a:ext cx="7198920" cy="719640"/>
           </a:xfrm>
           <a:prstGeom prst="rect">
             <a:avLst/>
@@ -4763,7 +4801,7 @@
         <p:spPr>
           <a:xfrm>
             <a:off x="504000" y="576000"/>
-            <a:ext cx="7199280" cy="719280"/>
+            <a:ext cx="7198920" cy="718920"/>
           </a:xfrm>
           <a:prstGeom prst="rect">
             <a:avLst/>
@@ -4783,7 +4821,7 @@
         <p:spPr>
           <a:xfrm>
             <a:off x="504000" y="1851120"/>
-            <a:ext cx="8393760" cy="4332600"/>
+            <a:ext cx="8393400" cy="4332240"/>
           </a:xfrm>
           <a:prstGeom prst="rect">
             <a:avLst/>
@@ -4952,7 +4990,7 @@
         <p:spPr>
           <a:xfrm>
             <a:off x="504000" y="576000"/>
-            <a:ext cx="7199280" cy="720000"/>
+            <a:ext cx="7198920" cy="719640"/>
           </a:xfrm>
           <a:prstGeom prst="rect">
             <a:avLst/>
@@ -5042,7 +5080,7 @@
         <p:spPr>
           <a:xfrm>
             <a:off x="504000" y="576000"/>
-            <a:ext cx="7199280" cy="719280"/>
+            <a:ext cx="7198920" cy="718920"/>
           </a:xfrm>
           <a:prstGeom prst="rect">
             <a:avLst/>
@@ -5062,7 +5100,7 @@
         <p:spPr>
           <a:xfrm>
             <a:off x="504000" y="1851120"/>
-            <a:ext cx="8393760" cy="4332600"/>
+            <a:ext cx="8393400" cy="4332240"/>
           </a:xfrm>
           <a:prstGeom prst="rect">
             <a:avLst/>
@@ -5205,7 +5243,7 @@
         <p:spPr>
           <a:xfrm>
             <a:off x="504000" y="576000"/>
-            <a:ext cx="7199280" cy="720000"/>
+            <a:ext cx="7198920" cy="719640"/>
           </a:xfrm>
           <a:prstGeom prst="rect">
             <a:avLst/>
@@ -5295,7 +5333,7 @@
         <p:spPr>
           <a:xfrm>
             <a:off x="504000" y="576000"/>
-            <a:ext cx="7199280" cy="719280"/>
+            <a:ext cx="7198920" cy="718920"/>
           </a:xfrm>
           <a:prstGeom prst="rect">
             <a:avLst/>
@@ -5336,7 +5374,7 @@
         <p:spPr>
           <a:xfrm>
             <a:off x="504000" y="2232000"/>
-            <a:ext cx="9071280" cy="3951720"/>
+            <a:ext cx="9070920" cy="3951360"/>
           </a:xfrm>
           <a:prstGeom prst="rect">
             <a:avLst/>
@@ -5480,7 +5518,7 @@
         <p:spPr>
           <a:xfrm>
             <a:off x="504000" y="576000"/>
-            <a:ext cx="7199280" cy="719280"/>
+            <a:ext cx="7198920" cy="718920"/>
           </a:xfrm>
           <a:prstGeom prst="rect">
             <a:avLst/>
@@ -5500,7 +5538,7 @@
         <p:spPr>
           <a:xfrm>
             <a:off x="504000" y="1851120"/>
-            <a:ext cx="8393760" cy="4332600"/>
+            <a:ext cx="8393400" cy="4332240"/>
           </a:xfrm>
           <a:prstGeom prst="rect">
             <a:avLst/>
@@ -5633,7 +5671,7 @@
         <p:spPr>
           <a:xfrm>
             <a:off x="504000" y="576000"/>
-            <a:ext cx="7199280" cy="720000"/>
+            <a:ext cx="7198920" cy="719640"/>
           </a:xfrm>
           <a:prstGeom prst="rect">
             <a:avLst/>
@@ -5723,7 +5761,7 @@
         <p:spPr>
           <a:xfrm>
             <a:off x="504000" y="576000"/>
-            <a:ext cx="7199280" cy="719280"/>
+            <a:ext cx="7198920" cy="718920"/>
           </a:xfrm>
           <a:prstGeom prst="rect">
             <a:avLst/>
@@ -5743,7 +5781,7 @@
         <p:spPr>
           <a:xfrm>
             <a:off x="504000" y="1851120"/>
-            <a:ext cx="8393760" cy="4500360"/>
+            <a:ext cx="8393400" cy="4500000"/>
           </a:xfrm>
           <a:prstGeom prst="rect">
             <a:avLst/>
@@ -5968,7 +6006,7 @@
         <p:spPr>
           <a:xfrm>
             <a:off x="504000" y="576000"/>
-            <a:ext cx="7199280" cy="720000"/>
+            <a:ext cx="7198920" cy="719640"/>
           </a:xfrm>
           <a:prstGeom prst="rect">
             <a:avLst/>
@@ -6058,7 +6096,7 @@
         <p:spPr>
           <a:xfrm>
             <a:off x="504000" y="576000"/>
-            <a:ext cx="7199280" cy="719280"/>
+            <a:ext cx="7198920" cy="718920"/>
           </a:xfrm>
           <a:prstGeom prst="rect">
             <a:avLst/>
@@ -6078,7 +6116,7 @@
         <p:spPr>
           <a:xfrm>
             <a:off x="504000" y="1636560"/>
-            <a:ext cx="8393760" cy="5143320"/>
+            <a:ext cx="8393400" cy="5142960"/>
           </a:xfrm>
           <a:prstGeom prst="rect">
             <a:avLst/>
@@ -6321,7 +6359,7 @@
         <p:spPr>
           <a:xfrm>
             <a:off x="504000" y="576000"/>
-            <a:ext cx="7199280" cy="720000"/>
+            <a:ext cx="7198920" cy="719640"/>
           </a:xfrm>
           <a:prstGeom prst="rect">
             <a:avLst/>
@@ -6411,7 +6449,7 @@
         <p:spPr>
           <a:xfrm>
             <a:off x="504000" y="576000"/>
-            <a:ext cx="7199280" cy="719280"/>
+            <a:ext cx="7198920" cy="718920"/>
           </a:xfrm>
           <a:prstGeom prst="rect">
             <a:avLst/>
@@ -6431,7 +6469,7 @@
         <p:spPr>
           <a:xfrm>
             <a:off x="504000" y="1851120"/>
-            <a:ext cx="8393760" cy="4332600"/>
+            <a:ext cx="8393400" cy="4332240"/>
           </a:xfrm>
           <a:prstGeom prst="rect">
             <a:avLst/>
@@ -6480,7 +6518,7 @@
         <p:spPr>
           <a:xfrm>
             <a:off x="504000" y="576000"/>
-            <a:ext cx="7199280" cy="720000"/>
+            <a:ext cx="7198920" cy="719640"/>
           </a:xfrm>
           <a:prstGeom prst="rect">
             <a:avLst/>
@@ -6527,7 +6565,7 @@
         <p:spPr>
           <a:xfrm>
             <a:off x="325440" y="3279600"/>
-            <a:ext cx="9386640" cy="2285640"/>
+            <a:ext cx="9386280" cy="2285280"/>
           </a:xfrm>
           <a:prstGeom prst="rect">
             <a:avLst/>
@@ -6595,7 +6633,7 @@
         <p:spPr>
           <a:xfrm>
             <a:off x="504000" y="576000"/>
-            <a:ext cx="7199280" cy="719280"/>
+            <a:ext cx="7198920" cy="718920"/>
           </a:xfrm>
           <a:prstGeom prst="rect">
             <a:avLst/>
@@ -6615,7 +6653,7 @@
         <p:spPr>
           <a:xfrm>
             <a:off x="504000" y="2637000"/>
-            <a:ext cx="8393760" cy="2571480"/>
+            <a:ext cx="8393400" cy="2571120"/>
           </a:xfrm>
           <a:prstGeom prst="rect">
             <a:avLst/>
@@ -6698,7 +6736,7 @@
         <p:spPr>
           <a:xfrm>
             <a:off x="504000" y="576000"/>
-            <a:ext cx="7199280" cy="720000"/>
+            <a:ext cx="7198920" cy="719640"/>
           </a:xfrm>
           <a:prstGeom prst="rect">
             <a:avLst/>
@@ -6788,7 +6826,7 @@
         <p:spPr>
           <a:xfrm>
             <a:off x="504000" y="576000"/>
-            <a:ext cx="7199280" cy="719280"/>
+            <a:ext cx="7198920" cy="718920"/>
           </a:xfrm>
           <a:prstGeom prst="rect">
             <a:avLst/>
@@ -6808,7 +6846,7 @@
         <p:spPr>
           <a:xfrm>
             <a:off x="576000" y="3096000"/>
-            <a:ext cx="9071280" cy="2231280"/>
+            <a:ext cx="9070920" cy="2230920"/>
           </a:xfrm>
           <a:prstGeom prst="rect">
             <a:avLst/>
@@ -6898,7 +6936,7 @@
         <p:spPr>
           <a:xfrm>
             <a:off x="504000" y="576000"/>
-            <a:ext cx="7199280" cy="719280"/>
+            <a:ext cx="7198920" cy="718920"/>
           </a:xfrm>
           <a:prstGeom prst="rect">
             <a:avLst/>
@@ -6918,7 +6956,7 @@
         <p:spPr>
           <a:xfrm>
             <a:off x="504000" y="1851120"/>
-            <a:ext cx="8393760" cy="1142640"/>
+            <a:ext cx="8393400" cy="1142280"/>
           </a:xfrm>
           <a:prstGeom prst="rect">
             <a:avLst/>
@@ -6959,7 +6997,7 @@
         <p:spPr>
           <a:xfrm>
             <a:off x="504000" y="576000"/>
-            <a:ext cx="7199280" cy="720000"/>
+            <a:ext cx="7198920" cy="719640"/>
           </a:xfrm>
           <a:prstGeom prst="rect">
             <a:avLst/>
@@ -7006,7 +7044,7 @@
         <p:spPr>
           <a:xfrm>
             <a:off x="754200" y="2851200"/>
-            <a:ext cx="8340120" cy="3285720"/>
+            <a:ext cx="8339760" cy="3285360"/>
           </a:xfrm>
           <a:prstGeom prst="rect">
             <a:avLst/>
@@ -7074,7 +7112,7 @@
         <p:spPr>
           <a:xfrm>
             <a:off x="504000" y="576000"/>
-            <a:ext cx="7199280" cy="719280"/>
+            <a:ext cx="7198920" cy="718920"/>
           </a:xfrm>
           <a:prstGeom prst="rect">
             <a:avLst/>
@@ -7094,7 +7132,7 @@
         <p:spPr>
           <a:xfrm>
             <a:off x="504000" y="1851120"/>
-            <a:ext cx="9179280" cy="4714560"/>
+            <a:ext cx="9178920" cy="4714200"/>
           </a:xfrm>
           <a:prstGeom prst="rect">
             <a:avLst/>
@@ -7315,7 +7353,7 @@
         <p:spPr>
           <a:xfrm>
             <a:off x="504000" y="576000"/>
-            <a:ext cx="7199280" cy="720000"/>
+            <a:ext cx="7198920" cy="719640"/>
           </a:xfrm>
           <a:prstGeom prst="rect">
             <a:avLst/>
@@ -7405,7 +7443,7 @@
         <p:spPr>
           <a:xfrm>
             <a:off x="504000" y="576000"/>
-            <a:ext cx="7199280" cy="719280"/>
+            <a:ext cx="7198920" cy="718920"/>
           </a:xfrm>
           <a:prstGeom prst="rect">
             <a:avLst/>
@@ -7425,7 +7463,7 @@
         <p:spPr>
           <a:xfrm>
             <a:off x="504000" y="1851120"/>
-            <a:ext cx="9179280" cy="1213920"/>
+            <a:ext cx="9178920" cy="1213560"/>
           </a:xfrm>
           <a:prstGeom prst="rect">
             <a:avLst/>
@@ -7466,7 +7504,7 @@
         <p:spPr>
           <a:xfrm>
             <a:off x="504000" y="576000"/>
-            <a:ext cx="7199280" cy="720000"/>
+            <a:ext cx="7198920" cy="719640"/>
           </a:xfrm>
           <a:prstGeom prst="rect">
             <a:avLst/>
@@ -7513,7 +7551,7 @@
         <p:spPr>
           <a:xfrm>
             <a:off x="468360" y="2637000"/>
-            <a:ext cx="9000720" cy="4151160"/>
+            <a:ext cx="9000360" cy="4150800"/>
           </a:xfrm>
           <a:prstGeom prst="rect">
             <a:avLst/>
@@ -7581,7 +7619,7 @@
         <p:spPr>
           <a:xfrm>
             <a:off x="504000" y="576000"/>
-            <a:ext cx="7199280" cy="719280"/>
+            <a:ext cx="7198920" cy="718920"/>
           </a:xfrm>
           <a:prstGeom prst="rect">
             <a:avLst/>
@@ -7601,7 +7639,7 @@
         <p:spPr>
           <a:xfrm>
             <a:off x="504000" y="3279600"/>
-            <a:ext cx="8822160" cy="1928520"/>
+            <a:ext cx="8821800" cy="1928160"/>
           </a:xfrm>
           <a:prstGeom prst="rect">
             <a:avLst/>
@@ -7642,7 +7680,7 @@
         <p:spPr>
           <a:xfrm>
             <a:off x="504000" y="576000"/>
-            <a:ext cx="7199280" cy="720000"/>
+            <a:ext cx="7198920" cy="719640"/>
           </a:xfrm>
           <a:prstGeom prst="rect">
             <a:avLst/>
@@ -7732,7 +7770,7 @@
         <p:spPr>
           <a:xfrm>
             <a:off x="504000" y="576000"/>
-            <a:ext cx="7199280" cy="719280"/>
+            <a:ext cx="7198920" cy="718920"/>
           </a:xfrm>
           <a:prstGeom prst="rect">
             <a:avLst/>
@@ -7752,7 +7790,7 @@
         <p:spPr>
           <a:xfrm>
             <a:off x="576000" y="3096000"/>
-            <a:ext cx="9071280" cy="2231280"/>
+            <a:ext cx="9070920" cy="2230920"/>
           </a:xfrm>
           <a:prstGeom prst="rect">
             <a:avLst/>
@@ -7842,7 +7880,7 @@
         <p:spPr>
           <a:xfrm>
             <a:off x="504000" y="576000"/>
-            <a:ext cx="7199280" cy="719280"/>
+            <a:ext cx="7198920" cy="718920"/>
           </a:xfrm>
           <a:prstGeom prst="rect">
             <a:avLst/>
@@ -7862,7 +7900,7 @@
         <p:spPr>
           <a:xfrm>
             <a:off x="504000" y="576000"/>
-            <a:ext cx="7199280" cy="720000"/>
+            <a:ext cx="7198920" cy="719640"/>
           </a:xfrm>
           <a:prstGeom prst="rect">
             <a:avLst/>
@@ -7909,7 +7947,7 @@
         <p:spPr>
           <a:xfrm>
             <a:off x="539640" y="1994040"/>
-            <a:ext cx="8705880" cy="5000400"/>
+            <a:ext cx="8705520" cy="5000040"/>
           </a:xfrm>
           <a:prstGeom prst="rect">
             <a:avLst/>
@@ -7977,7 +8015,7 @@
         <p:spPr>
           <a:xfrm>
             <a:off x="504000" y="576000"/>
-            <a:ext cx="7199280" cy="719280"/>
+            <a:ext cx="7198920" cy="718920"/>
           </a:xfrm>
           <a:prstGeom prst="rect">
             <a:avLst/>
@@ -7997,7 +8035,7 @@
         <p:spPr>
           <a:xfrm>
             <a:off x="468360" y="2208240"/>
-            <a:ext cx="8393760" cy="2999880"/>
+            <a:ext cx="8393400" cy="2999520"/>
           </a:xfrm>
           <a:prstGeom prst="rect">
             <a:avLst/>
@@ -8064,7 +8102,7 @@
         <p:spPr>
           <a:xfrm>
             <a:off x="504000" y="576000"/>
-            <a:ext cx="7199280" cy="720000"/>
+            <a:ext cx="7198920" cy="719640"/>
           </a:xfrm>
           <a:prstGeom prst="rect">
             <a:avLst/>
@@ -8154,7 +8192,7 @@
         <p:spPr>
           <a:xfrm>
             <a:off x="504000" y="576000"/>
-            <a:ext cx="7199280" cy="719280"/>
+            <a:ext cx="7198920" cy="718920"/>
           </a:xfrm>
           <a:prstGeom prst="rect">
             <a:avLst/>
@@ -8174,7 +8212,7 @@
         <p:spPr>
           <a:xfrm>
             <a:off x="576000" y="3096000"/>
-            <a:ext cx="9071280" cy="2231280"/>
+            <a:ext cx="9070920" cy="2230920"/>
           </a:xfrm>
           <a:prstGeom prst="rect">
             <a:avLst/>
@@ -8264,7 +8302,7 @@
         <p:spPr>
           <a:xfrm>
             <a:off x="504000" y="576000"/>
-            <a:ext cx="7199280" cy="719280"/>
+            <a:ext cx="7198920" cy="718920"/>
           </a:xfrm>
           <a:prstGeom prst="rect">
             <a:avLst/>
@@ -8284,7 +8322,7 @@
         <p:spPr>
           <a:xfrm>
             <a:off x="468360" y="1708200"/>
-            <a:ext cx="9072360" cy="4857480"/>
+            <a:ext cx="9072000" cy="4857120"/>
           </a:xfrm>
           <a:prstGeom prst="rect">
             <a:avLst/>
@@ -8572,7 +8610,7 @@
         <p:spPr>
           <a:xfrm>
             <a:off x="504000" y="576000"/>
-            <a:ext cx="7199280" cy="720000"/>
+            <a:ext cx="7198920" cy="719640"/>
           </a:xfrm>
           <a:prstGeom prst="rect">
             <a:avLst/>
@@ -8662,7 +8700,7 @@
         <p:spPr>
           <a:xfrm>
             <a:off x="504000" y="576000"/>
-            <a:ext cx="7199280" cy="719280"/>
+            <a:ext cx="7198920" cy="718920"/>
           </a:xfrm>
           <a:prstGeom prst="rect">
             <a:avLst/>
@@ -8682,7 +8720,7 @@
         <p:spPr>
           <a:xfrm>
             <a:off x="468360" y="1708200"/>
-            <a:ext cx="9072360" cy="4857480"/>
+            <a:ext cx="9072000" cy="4857120"/>
           </a:xfrm>
           <a:prstGeom prst="rect">
             <a:avLst/>
@@ -8950,6 +8988,59 @@
                 <a:spcPct val="100000"/>
               </a:lnSpc>
             </a:pPr>
+            <a:r>
+              <a:rPr lang="en-US" sz="2400">
+                <a:solidFill>
+                  <a:srgbClr val="000000"/>
+                </a:solidFill>
+                <a:latin typeface="Arial"/>
+                <a:ea typeface="DejaVu Sans"/>
+              </a:rPr>
+              <a:t>This Document:</a:t>
+            </a:r>
+            <a:endParaRPr/>
+          </a:p>
+          <a:p>
+            <a:pPr>
+              <a:lnSpc>
+                <a:spcPct val="100000"/>
+              </a:lnSpc>
+            </a:pPr>
+            <a:r>
+              <a:rPr lang="en-US" sz="2400">
+                <a:solidFill>
+                  <a:srgbClr val="000000"/>
+                </a:solidFill>
+                <a:latin typeface="Arial"/>
+                <a:ea typeface="DejaVu Sans"/>
+                <a:hlinkClick r:id="rId13"/>
+              </a:rPr>
+              <a:t>https://github.com/raidenawkward/android-presentation</a:t>
+            </a:r>
+            <a:endParaRPr/>
+          </a:p>
+          <a:p>
+            <a:pPr>
+              <a:lnSpc>
+                <a:spcPct val="100000"/>
+              </a:lnSpc>
+            </a:pPr>
+            <a:endParaRPr/>
+          </a:p>
+          <a:p>
+            <a:pPr>
+              <a:lnSpc>
+                <a:spcPct val="100000"/>
+              </a:lnSpc>
+            </a:pPr>
+            <a:endParaRPr/>
+          </a:p>
+          <a:p>
+            <a:pPr>
+              <a:lnSpc>
+                <a:spcPct val="100000"/>
+              </a:lnSpc>
+            </a:pPr>
             <a:endParaRPr/>
           </a:p>
           <a:p>
@@ -8979,7 +9070,7 @@
         <p:spPr>
           <a:xfrm>
             <a:off x="504000" y="576000"/>
-            <a:ext cx="7199280" cy="720000"/>
+            <a:ext cx="7198920" cy="719640"/>
           </a:xfrm>
           <a:prstGeom prst="rect">
             <a:avLst/>
@@ -9069,7 +9160,7 @@
         <p:spPr>
           <a:xfrm>
             <a:off x="504000" y="576000"/>
-            <a:ext cx="7199280" cy="719280"/>
+            <a:ext cx="7198920" cy="718920"/>
           </a:xfrm>
           <a:prstGeom prst="rect">
             <a:avLst/>
@@ -9089,7 +9180,7 @@
         <p:spPr>
           <a:xfrm>
             <a:off x="468360" y="2779560"/>
-            <a:ext cx="9072360" cy="2785680"/>
+            <a:ext cx="9072000" cy="2785320"/>
           </a:xfrm>
           <a:prstGeom prst="rect">
             <a:avLst/>
@@ -9130,7 +9221,7 @@
         <p:spPr>
           <a:xfrm>
             <a:off x="504000" y="576000"/>
-            <a:ext cx="7199280" cy="720000"/>
+            <a:ext cx="7198920" cy="719640"/>
           </a:xfrm>
           <a:prstGeom prst="rect">
             <a:avLst/>
@@ -9199,7 +9290,7 @@
         <p:spPr>
           <a:xfrm>
             <a:off x="504000" y="576000"/>
-            <a:ext cx="7199280" cy="719280"/>
+            <a:ext cx="7198920" cy="718920"/>
           </a:xfrm>
           <a:prstGeom prst="rect">
             <a:avLst/>
@@ -9219,7 +9310,7 @@
         <p:spPr>
           <a:xfrm>
             <a:off x="468360" y="2779560"/>
-            <a:ext cx="9072360" cy="2785680"/>
+            <a:ext cx="9072000" cy="2785320"/>
           </a:xfrm>
           <a:prstGeom prst="rect">
             <a:avLst/>
@@ -9260,7 +9351,7 @@
         <p:spPr>
           <a:xfrm>
             <a:off x="504000" y="576000"/>
-            <a:ext cx="7199280" cy="720000"/>
+            <a:ext cx="7198920" cy="719640"/>
           </a:xfrm>
           <a:prstGeom prst="rect">
             <a:avLst/>
@@ -9329,7 +9420,7 @@
         <p:spPr>
           <a:xfrm>
             <a:off x="504000" y="576000"/>
-            <a:ext cx="7199280" cy="719280"/>
+            <a:ext cx="7198920" cy="718920"/>
           </a:xfrm>
           <a:prstGeom prst="rect">
             <a:avLst/>
@@ -9349,7 +9440,7 @@
         <p:spPr>
           <a:xfrm>
             <a:off x="504000" y="2422440"/>
-            <a:ext cx="9071280" cy="3265200"/>
+            <a:ext cx="9070920" cy="3264840"/>
           </a:xfrm>
           <a:prstGeom prst="rect">
             <a:avLst/>
@@ -9458,7 +9549,7 @@
         <p:spPr>
           <a:xfrm>
             <a:off x="504000" y="576000"/>
-            <a:ext cx="7199280" cy="720000"/>
+            <a:ext cx="7198920" cy="719640"/>
           </a:xfrm>
           <a:prstGeom prst="rect">
             <a:avLst/>
@@ -9548,7 +9639,7 @@
         <p:spPr>
           <a:xfrm>
             <a:off x="504000" y="576000"/>
-            <a:ext cx="7199280" cy="719280"/>
+            <a:ext cx="7198920" cy="718920"/>
           </a:xfrm>
           <a:prstGeom prst="rect">
             <a:avLst/>
@@ -9568,7 +9659,7 @@
         <p:spPr>
           <a:xfrm>
             <a:off x="504000" y="576000"/>
-            <a:ext cx="7199280" cy="720000"/>
+            <a:ext cx="7198920" cy="719640"/>
           </a:xfrm>
           <a:prstGeom prst="rect">
             <a:avLst/>
@@ -9615,7 +9706,7 @@
         <p:spPr>
           <a:xfrm>
             <a:off x="325440" y="1351080"/>
-            <a:ext cx="8804520" cy="5928840"/>
+            <a:ext cx="8804160" cy="5928480"/>
           </a:xfrm>
           <a:prstGeom prst="rect">
             <a:avLst/>
@@ -9683,7 +9774,7 @@
         <p:spPr>
           <a:xfrm>
             <a:off x="504000" y="576000"/>
-            <a:ext cx="7199280" cy="719280"/>
+            <a:ext cx="7198920" cy="718920"/>
           </a:xfrm>
           <a:prstGeom prst="rect">
             <a:avLst/>
@@ -9703,7 +9794,7 @@
         <p:spPr>
           <a:xfrm>
             <a:off x="504000" y="1800000"/>
-            <a:ext cx="9071280" cy="1979640"/>
+            <a:ext cx="9070920" cy="1979280"/>
           </a:xfrm>
           <a:prstGeom prst="rect">
             <a:avLst/>
@@ -9780,7 +9871,7 @@
         <p:spPr>
           <a:xfrm>
             <a:off x="504000" y="576000"/>
-            <a:ext cx="7199280" cy="720000"/>
+            <a:ext cx="7198920" cy="719640"/>
           </a:xfrm>
           <a:prstGeom prst="rect">
             <a:avLst/>
@@ -9827,7 +9918,7 @@
         <p:spPr>
           <a:xfrm>
             <a:off x="611280" y="3851280"/>
-            <a:ext cx="8472240" cy="2071440"/>
+            <a:ext cx="8471880" cy="2071080"/>
           </a:xfrm>
           <a:prstGeom prst="rect">
             <a:avLst/>
@@ -9888,18 +9979,22 @@
       </p:grpSpPr>
       <p:sp>
         <p:nvSpPr>
-          <p:cNvPr id="91" name="TextShape 1"/>
-          <p:cNvSpPr txBox="1"/>
+          <p:cNvPr id="91" name="CustomShape 1"/>
+          <p:cNvSpPr/>
           <p:nvPr/>
         </p:nvSpPr>
         <p:spPr>
           <a:xfrm>
             <a:off x="504000" y="576000"/>
-            <a:ext cx="7199280" cy="720000"/>
-          </a:xfrm>
-          <a:prstGeom prst="rect">
-            <a:avLst/>
-          </a:prstGeom>
+            <a:ext cx="7198920" cy="719640"/>
+          </a:xfrm>
+          <a:prstGeom prst="rect">
+            <a:avLst/>
+          </a:prstGeom>
+          <a:noFill/>
+          <a:ln>
+            <a:noFill/>
+          </a:ln>
         </p:spPr>
         <p:txBody>
           <a:bodyPr anchor="ctr" bIns="0" lIns="0" rIns="0" tIns="0"/>
@@ -9910,7 +10005,7 @@
               </a:lnSpc>
             </a:pPr>
             <a:r>
-              <a:rPr lang="zh-CN" sz="3600">
+              <a:rPr lang="en-US" sz="3600">
                 <a:solidFill>
                   <a:srgbClr val="000000"/>
                 </a:solidFill>
@@ -9925,24 +10020,28 @@
       </p:sp>
       <p:sp>
         <p:nvSpPr>
-          <p:cNvPr id="92" name="TextShape 2"/>
-          <p:cNvSpPr txBox="1"/>
+          <p:cNvPr id="92" name="CustomShape 2"/>
+          <p:cNvSpPr/>
           <p:nvPr/>
         </p:nvSpPr>
         <p:spPr>
           <a:xfrm>
             <a:off x="968400" y="1851120"/>
-            <a:ext cx="7199280" cy="720000"/>
-          </a:xfrm>
-          <a:prstGeom prst="rect">
-            <a:avLst/>
-          </a:prstGeom>
+            <a:ext cx="7198920" cy="719640"/>
+          </a:xfrm>
+          <a:prstGeom prst="rect">
+            <a:avLst/>
+          </a:prstGeom>
+          <a:noFill/>
+          <a:ln>
+            <a:noFill/>
+          </a:ln>
         </p:spPr>
         <p:txBody>
           <a:bodyPr bIns="0" lIns="0" rIns="0" tIns="0"/>
           <a:p>
             <a:r>
-              <a:rPr lang="zh-CN" sz="2400"/>
+              <a:rPr lang="en-US" sz="2400"/>
               <a:t>ver 2:</a:t>
             </a:r>
             <a:endParaRPr/>
@@ -9964,7 +10063,7 @@
         <p:spPr>
           <a:xfrm>
             <a:off x="968400" y="3137040"/>
-            <a:ext cx="8041680" cy="1999800"/>
+            <a:ext cx="8041320" cy="1999440"/>
           </a:xfrm>
           <a:prstGeom prst="rect">
             <a:avLst/>
@@ -9998,18 +10097,22 @@
       </p:grpSpPr>
       <p:sp>
         <p:nvSpPr>
-          <p:cNvPr id="94" name="TextShape 1"/>
-          <p:cNvSpPr txBox="1"/>
+          <p:cNvPr id="94" name="CustomShape 1"/>
+          <p:cNvSpPr/>
           <p:nvPr/>
         </p:nvSpPr>
         <p:spPr>
           <a:xfrm>
             <a:off x="504000" y="576000"/>
-            <a:ext cx="7199280" cy="720000"/>
-          </a:xfrm>
-          <a:prstGeom prst="rect">
-            <a:avLst/>
-          </a:prstGeom>
+            <a:ext cx="7198920" cy="719640"/>
+          </a:xfrm>
+          <a:prstGeom prst="rect">
+            <a:avLst/>
+          </a:prstGeom>
+          <a:noFill/>
+          <a:ln>
+            <a:noFill/>
+          </a:ln>
         </p:spPr>
         <p:txBody>
           <a:bodyPr anchor="ctr" bIns="0" lIns="0" rIns="0" tIns="0"/>
@@ -10020,7 +10123,7 @@
               </a:lnSpc>
             </a:pPr>
             <a:r>
-              <a:rPr lang="zh-CN" sz="3600">
+              <a:rPr lang="en-US" sz="3600">
                 <a:solidFill>
                   <a:srgbClr val="000000"/>
                 </a:solidFill>
@@ -10035,24 +10138,28 @@
       </p:sp>
       <p:sp>
         <p:nvSpPr>
-          <p:cNvPr id="95" name="TextShape 2"/>
-          <p:cNvSpPr txBox="1"/>
+          <p:cNvPr id="95" name="CustomShape 2"/>
+          <p:cNvSpPr/>
           <p:nvPr/>
         </p:nvSpPr>
         <p:spPr>
           <a:xfrm>
             <a:off x="968400" y="1851120"/>
-            <a:ext cx="7199280" cy="720000"/>
-          </a:xfrm>
-          <a:prstGeom prst="rect">
-            <a:avLst/>
-          </a:prstGeom>
+            <a:ext cx="7198920" cy="719640"/>
+          </a:xfrm>
+          <a:prstGeom prst="rect">
+            <a:avLst/>
+          </a:prstGeom>
+          <a:noFill/>
+          <a:ln>
+            <a:noFill/>
+          </a:ln>
         </p:spPr>
         <p:txBody>
           <a:bodyPr bIns="0" lIns="0" rIns="0" tIns="0"/>
           <a:p>
             <a:r>
-              <a:rPr lang="zh-CN" sz="2400"/>
+              <a:rPr lang="en-US" sz="2400"/>
               <a:t>ver 3:</a:t>
             </a:r>
             <a:endParaRPr/>
@@ -10074,7 +10181,7 @@
         <p:spPr>
           <a:xfrm>
             <a:off x="896760" y="3137040"/>
-            <a:ext cx="8326440" cy="2714400"/>
+            <a:ext cx="8326080" cy="2714040"/>
           </a:xfrm>
           <a:prstGeom prst="rect">
             <a:avLst/>
@@ -10108,18 +10215,22 @@
       </p:grpSpPr>
       <p:sp>
         <p:nvSpPr>
-          <p:cNvPr id="97" name="TextShape 1"/>
-          <p:cNvSpPr txBox="1"/>
+          <p:cNvPr id="97" name="CustomShape 1"/>
+          <p:cNvSpPr/>
           <p:nvPr/>
         </p:nvSpPr>
         <p:spPr>
           <a:xfrm>
             <a:off x="504000" y="576000"/>
-            <a:ext cx="7199280" cy="720000"/>
-          </a:xfrm>
-          <a:prstGeom prst="rect">
-            <a:avLst/>
-          </a:prstGeom>
+            <a:ext cx="7198920" cy="719640"/>
+          </a:xfrm>
+          <a:prstGeom prst="rect">
+            <a:avLst/>
+          </a:prstGeom>
+          <a:noFill/>
+          <a:ln>
+            <a:noFill/>
+          </a:ln>
         </p:spPr>
         <p:txBody>
           <a:bodyPr anchor="ctr" bIns="0" lIns="0" rIns="0" tIns="0"/>
@@ -10130,7 +10241,7 @@
               </a:lnSpc>
             </a:pPr>
             <a:r>
-              <a:rPr lang="zh-CN" sz="3600">
+              <a:rPr lang="en-US" sz="3600">
                 <a:solidFill>
                   <a:srgbClr val="000000"/>
                 </a:solidFill>
@@ -10145,24 +10256,28 @@
       </p:sp>
       <p:sp>
         <p:nvSpPr>
-          <p:cNvPr id="98" name="TextShape 2"/>
-          <p:cNvSpPr txBox="1"/>
+          <p:cNvPr id="98" name="CustomShape 2"/>
+          <p:cNvSpPr/>
           <p:nvPr/>
         </p:nvSpPr>
         <p:spPr>
           <a:xfrm>
             <a:off x="968400" y="1851120"/>
-            <a:ext cx="7199280" cy="720000"/>
-          </a:xfrm>
-          <a:prstGeom prst="rect">
-            <a:avLst/>
-          </a:prstGeom>
+            <a:ext cx="7198920" cy="719640"/>
+          </a:xfrm>
+          <a:prstGeom prst="rect">
+            <a:avLst/>
+          </a:prstGeom>
+          <a:noFill/>
+          <a:ln>
+            <a:noFill/>
+          </a:ln>
         </p:spPr>
         <p:txBody>
           <a:bodyPr bIns="0" lIns="0" rIns="0" tIns="0"/>
           <a:p>
             <a:r>
-              <a:rPr lang="zh-CN" sz="2400"/>
+              <a:rPr lang="en-US" sz="2400"/>
               <a:t>ver 4:</a:t>
             </a:r>
             <a:endParaRPr/>
@@ -10184,7 +10299,7 @@
         <p:spPr>
           <a:xfrm>
             <a:off x="754200" y="2994120"/>
-            <a:ext cx="8615160" cy="2571480"/>
+            <a:ext cx="8614800" cy="2571120"/>
           </a:xfrm>
           <a:prstGeom prst="rect">
             <a:avLst/>

</xml_diff>